<commit_message>
Reviewed Security session: latest packages, updated presentation and demos
</commit_message>
<xml_diff>
--- a/presentations/04_Security.pptx
+++ b/presentations/04_Security.pptx
@@ -269,7 +269,7 @@
           <a:p>
             <a:fld id="{5B3CF26E-0687-4C54-85B5-9144DF51ABD2}" type="datetimeFigureOut">
               <a:rPr lang="en-US" smtClean="0"/>
-              <a:t>15-Apr-22</a:t>
+              <a:t>25-May-22</a:t>
             </a:fld>
             <a:endParaRPr lang="en-US"/>
           </a:p>
@@ -2221,7 +2221,7 @@
             </a:pPr>
             <a:r>
               <a:rPr lang="en-US" dirty="0"/>
-              <a:t>As it was internal app maintained on best-efforts manner, there were no documents how to deal with it, thus …</a:t>
+              <a:t>As it was an internal app maintained in a best-efforts manner, there were no documents on how to deal with it, thus …</a:t>
             </a:r>
           </a:p>
           <a:p>
@@ -2231,7 +2231,7 @@
             </a:pPr>
             <a:r>
               <a:rPr lang="en-US" dirty="0"/>
-              <a:t>On-call engineer restarted the app without knowing that hard restart requires hardware security module (HSM) smart-card.</a:t>
+              <a:t>On-call engineer restarted the app without knowing that hard restart requires a hardware security module (HSM) smart-card.</a:t>
             </a:r>
           </a:p>
           <a:p>
@@ -2241,7 +2241,15 @@
             </a:pPr>
             <a:r>
               <a:rPr lang="en-US" dirty="0"/>
-              <a:t>These smart cards are stored in several offices in physical safes but not in the office where on-call engineer was (New York)</a:t>
+              <a:t>These smart cards are stored in several offices in physical safes but not in the office </a:t>
+            </a:r>
+            <a:r>
+              <a:rPr lang="en-US"/>
+              <a:t>where the on-call </a:t>
+            </a:r>
+            <a:r>
+              <a:rPr lang="en-US" dirty="0"/>
+              <a:t>engineer was (New York)</a:t>
             </a:r>
           </a:p>
           <a:p>
@@ -2261,7 +2269,7 @@
             </a:pPr>
             <a:r>
               <a:rPr lang="en-US" dirty="0"/>
-              <a:t>The secret combination is stored in password manager…</a:t>
+              <a:t>The secret combination is stored in the password manager…</a:t>
             </a:r>
           </a:p>
           <a:p>
@@ -2271,7 +2279,7 @@
             </a:pPr>
             <a:r>
               <a:rPr lang="en-US" dirty="0"/>
-              <a:t>They called other offices and finally found a person who remembers the combination by-heart and can open the safe</a:t>
+              <a:t>They called other offices and finally found a person who remembers the combination by heart and can open the safe</a:t>
             </a:r>
           </a:p>
           <a:p>
@@ -2281,7 +2289,7 @@
             </a:pPr>
             <a:r>
               <a:rPr lang="en-US" dirty="0"/>
-              <a:t>But when they inserted the smart-card it returned cryptic error…</a:t>
+              <a:t>But when they inserted the smart-card it returned a cryptic error…</a:t>
             </a:r>
           </a:p>
           <a:p>
@@ -2291,7 +2299,7 @@
             </a:pPr>
             <a:r>
               <a:rPr lang="en-US" dirty="0"/>
-              <a:t>Meanwhile, Australian office decided to use power drill to open their safe, but their card gave the same error.</a:t>
+              <a:t>Meanwhile, the Australian office decided to use a power drill to open their safe, but their card gave the same error.</a:t>
             </a:r>
           </a:p>
           <a:p>
@@ -2301,7 +2309,7 @@
             </a:pPr>
             <a:r>
               <a:rPr lang="en-US" dirty="0"/>
-              <a:t>After an additional hour, someone understood that green light on the smart card indicates nothing and it should be flipped.</a:t>
+              <a:t>After an additional hour, someone understood that the green light on the smart card indicates nothing and it should be flipped.</a:t>
             </a:r>
           </a:p>
           <a:p>
@@ -5977,7 +5985,7 @@
           <a:p>
             <a:fld id="{8BBDE38F-7EFF-44D7-A4FC-86F4469E67EF}" type="datetimeFigureOut">
               <a:rPr lang="en-US" smtClean="0"/>
-              <a:t>15-Apr-22</a:t>
+              <a:t>25-May-22</a:t>
             </a:fld>
             <a:endParaRPr lang="en-US"/>
           </a:p>
@@ -6175,7 +6183,7 @@
           <a:p>
             <a:fld id="{8BBDE38F-7EFF-44D7-A4FC-86F4469E67EF}" type="datetimeFigureOut">
               <a:rPr lang="en-US" smtClean="0"/>
-              <a:t>15-Apr-22</a:t>
+              <a:t>25-May-22</a:t>
             </a:fld>
             <a:endParaRPr lang="en-US"/>
           </a:p>
@@ -6383,7 +6391,7 @@
           <a:p>
             <a:fld id="{8BBDE38F-7EFF-44D7-A4FC-86F4469E67EF}" type="datetimeFigureOut">
               <a:rPr lang="en-US" smtClean="0"/>
-              <a:t>15-Apr-22</a:t>
+              <a:t>25-May-22</a:t>
             </a:fld>
             <a:endParaRPr lang="en-US"/>
           </a:p>
@@ -6581,7 +6589,7 @@
           <a:p>
             <a:fld id="{8BBDE38F-7EFF-44D7-A4FC-86F4469E67EF}" type="datetimeFigureOut">
               <a:rPr lang="en-US" smtClean="0"/>
-              <a:t>15-Apr-22</a:t>
+              <a:t>25-May-22</a:t>
             </a:fld>
             <a:endParaRPr lang="en-US"/>
           </a:p>
@@ -6856,7 +6864,7 @@
           <a:p>
             <a:fld id="{8BBDE38F-7EFF-44D7-A4FC-86F4469E67EF}" type="datetimeFigureOut">
               <a:rPr lang="en-US" smtClean="0"/>
-              <a:t>15-Apr-22</a:t>
+              <a:t>25-May-22</a:t>
             </a:fld>
             <a:endParaRPr lang="en-US"/>
           </a:p>
@@ -7121,7 +7129,7 @@
           <a:p>
             <a:fld id="{8BBDE38F-7EFF-44D7-A4FC-86F4469E67EF}" type="datetimeFigureOut">
               <a:rPr lang="en-US" smtClean="0"/>
-              <a:t>15-Apr-22</a:t>
+              <a:t>25-May-22</a:t>
             </a:fld>
             <a:endParaRPr lang="en-US"/>
           </a:p>
@@ -7533,7 +7541,7 @@
           <a:p>
             <a:fld id="{8BBDE38F-7EFF-44D7-A4FC-86F4469E67EF}" type="datetimeFigureOut">
               <a:rPr lang="en-US" smtClean="0"/>
-              <a:t>15-Apr-22</a:t>
+              <a:t>25-May-22</a:t>
             </a:fld>
             <a:endParaRPr lang="en-US"/>
           </a:p>
@@ -7674,7 +7682,7 @@
           <a:p>
             <a:fld id="{8BBDE38F-7EFF-44D7-A4FC-86F4469E67EF}" type="datetimeFigureOut">
               <a:rPr lang="en-US" smtClean="0"/>
-              <a:t>15-Apr-22</a:t>
+              <a:t>25-May-22</a:t>
             </a:fld>
             <a:endParaRPr lang="en-US"/>
           </a:p>
@@ -7787,7 +7795,7 @@
           <a:p>
             <a:fld id="{8BBDE38F-7EFF-44D7-A4FC-86F4469E67EF}" type="datetimeFigureOut">
               <a:rPr lang="en-US" smtClean="0"/>
-              <a:t>15-Apr-22</a:t>
+              <a:t>25-May-22</a:t>
             </a:fld>
             <a:endParaRPr lang="en-US"/>
           </a:p>
@@ -8098,7 +8106,7 @@
           <a:p>
             <a:fld id="{8BBDE38F-7EFF-44D7-A4FC-86F4469E67EF}" type="datetimeFigureOut">
               <a:rPr lang="en-US" smtClean="0"/>
-              <a:t>15-Apr-22</a:t>
+              <a:t>25-May-22</a:t>
             </a:fld>
             <a:endParaRPr lang="en-US"/>
           </a:p>
@@ -8386,7 +8394,7 @@
           <a:p>
             <a:fld id="{8BBDE38F-7EFF-44D7-A4FC-86F4469E67EF}" type="datetimeFigureOut">
               <a:rPr lang="en-US" smtClean="0"/>
-              <a:t>15-Apr-22</a:t>
+              <a:t>25-May-22</a:t>
             </a:fld>
             <a:endParaRPr lang="en-US"/>
           </a:p>
@@ -8627,7 +8635,7 @@
           <a:p>
             <a:fld id="{8BBDE38F-7EFF-44D7-A4FC-86F4469E67EF}" type="datetimeFigureOut">
               <a:rPr lang="en-US" smtClean="0"/>
-              <a:t>15-Apr-22</a:t>
+              <a:t>25-May-22</a:t>
             </a:fld>
             <a:endParaRPr lang="en-US"/>
           </a:p>

</xml_diff>

<commit_message>
Updated 04 and 05 presentations
</commit_message>
<xml_diff>
--- a/presentations/04_Security.pptx
+++ b/presentations/04_Security.pptx
@@ -56,22 +56,22 @@
     <p:sldId id="317" r:id="rId47"/>
     <p:sldId id="319" r:id="rId48"/>
     <p:sldId id="318" r:id="rId49"/>
-    <p:sldId id="323" r:id="rId50"/>
-    <p:sldId id="324" r:id="rId51"/>
-    <p:sldId id="314" r:id="rId52"/>
-    <p:sldId id="294" r:id="rId53"/>
-    <p:sldId id="296" r:id="rId54"/>
-    <p:sldId id="297" r:id="rId55"/>
-    <p:sldId id="298" r:id="rId56"/>
-    <p:sldId id="300" r:id="rId57"/>
-    <p:sldId id="299" r:id="rId58"/>
-    <p:sldId id="328" r:id="rId59"/>
-    <p:sldId id="301" r:id="rId60"/>
-    <p:sldId id="302" r:id="rId61"/>
-    <p:sldId id="303" r:id="rId62"/>
-    <p:sldId id="304" r:id="rId63"/>
-    <p:sldId id="306" r:id="rId64"/>
-    <p:sldId id="307" r:id="rId65"/>
+    <p:sldId id="314" r:id="rId50"/>
+    <p:sldId id="323" r:id="rId51"/>
+    <p:sldId id="324" r:id="rId52"/>
+    <p:sldId id="331" r:id="rId53"/>
+    <p:sldId id="294" r:id="rId54"/>
+    <p:sldId id="296" r:id="rId55"/>
+    <p:sldId id="297" r:id="rId56"/>
+    <p:sldId id="298" r:id="rId57"/>
+    <p:sldId id="300" r:id="rId58"/>
+    <p:sldId id="299" r:id="rId59"/>
+    <p:sldId id="328" r:id="rId60"/>
+    <p:sldId id="301" r:id="rId61"/>
+    <p:sldId id="302" r:id="rId62"/>
+    <p:sldId id="303" r:id="rId63"/>
+    <p:sldId id="304" r:id="rId64"/>
+    <p:sldId id="306" r:id="rId65"/>
     <p:sldId id="310" r:id="rId66"/>
   </p:sldIdLst>
   <p:sldSz cx="12192000" cy="6858000"/>
@@ -269,7 +269,7 @@
           <a:p>
             <a:fld id="{5B3CF26E-0687-4C54-85B5-9144DF51ABD2}" type="datetimeFigureOut">
               <a:rPr lang="en-US" smtClean="0"/>
-              <a:t>25-May-22</a:t>
+              <a:t>08-Jun-22</a:t>
             </a:fld>
             <a:endParaRPr lang="en-US"/>
           </a:p>
@@ -2481,7 +2481,10 @@
           <a:bodyPr/>
           <a:lstStyle/>
           <a:p>
-            <a:endParaRPr lang="en-US" dirty="0"/>
+            <a:r>
+              <a:rPr lang="en-US" dirty="0"/>
+              <a:t>Fail-safe vs fail open</a:t>
+            </a:r>
           </a:p>
         </p:txBody>
       </p:sp>
@@ -3663,7 +3666,7 @@
     </p:spTree>
     <p:extLst>
       <p:ext uri="{BB962C8B-B14F-4D97-AF65-F5344CB8AC3E}">
-        <p14:creationId xmlns:p14="http://schemas.microsoft.com/office/powerpoint/2010/main" val="333483114"/>
+        <p14:creationId xmlns:p14="http://schemas.microsoft.com/office/powerpoint/2010/main" val="2183025364"/>
       </p:ext>
     </p:extLst>
   </p:cSld>
@@ -3747,7 +3750,7 @@
     </p:spTree>
     <p:extLst>
       <p:ext uri="{BB962C8B-B14F-4D97-AF65-F5344CB8AC3E}">
-        <p14:creationId xmlns:p14="http://schemas.microsoft.com/office/powerpoint/2010/main" val="236537418"/>
+        <p14:creationId xmlns:p14="http://schemas.microsoft.com/office/powerpoint/2010/main" val="333483114"/>
       </p:ext>
     </p:extLst>
   </p:cSld>
@@ -3831,7 +3834,7 @@
     </p:spTree>
     <p:extLst>
       <p:ext uri="{BB962C8B-B14F-4D97-AF65-F5344CB8AC3E}">
-        <p14:creationId xmlns:p14="http://schemas.microsoft.com/office/powerpoint/2010/main" val="2183025364"/>
+        <p14:creationId xmlns:p14="http://schemas.microsoft.com/office/powerpoint/2010/main" val="236537418"/>
       </p:ext>
     </p:extLst>
   </p:cSld>
@@ -3915,7 +3918,7 @@
     </p:spTree>
     <p:extLst>
       <p:ext uri="{BB962C8B-B14F-4D97-AF65-F5344CB8AC3E}">
-        <p14:creationId xmlns:p14="http://schemas.microsoft.com/office/powerpoint/2010/main" val="3379131748"/>
+        <p14:creationId xmlns:p14="http://schemas.microsoft.com/office/powerpoint/2010/main" val="797949390"/>
       </p:ext>
     </p:extLst>
   </p:cSld>
@@ -4143,7 +4146,7 @@
     </p:spTree>
     <p:extLst>
       <p:ext uri="{BB962C8B-B14F-4D97-AF65-F5344CB8AC3E}">
-        <p14:creationId xmlns:p14="http://schemas.microsoft.com/office/powerpoint/2010/main" val="1541529435"/>
+        <p14:creationId xmlns:p14="http://schemas.microsoft.com/office/powerpoint/2010/main" val="3379131748"/>
       </p:ext>
     </p:extLst>
   </p:cSld>
@@ -4227,7 +4230,7 @@
     </p:spTree>
     <p:extLst>
       <p:ext uri="{BB962C8B-B14F-4D97-AF65-F5344CB8AC3E}">
-        <p14:creationId xmlns:p14="http://schemas.microsoft.com/office/powerpoint/2010/main" val="2012134742"/>
+        <p14:creationId xmlns:p14="http://schemas.microsoft.com/office/powerpoint/2010/main" val="1541529435"/>
       </p:ext>
     </p:extLst>
   </p:cSld>
@@ -4311,7 +4314,7 @@
     </p:spTree>
     <p:extLst>
       <p:ext uri="{BB962C8B-B14F-4D97-AF65-F5344CB8AC3E}">
-        <p14:creationId xmlns:p14="http://schemas.microsoft.com/office/powerpoint/2010/main" val="2543381281"/>
+        <p14:creationId xmlns:p14="http://schemas.microsoft.com/office/powerpoint/2010/main" val="2012134742"/>
       </p:ext>
     </p:extLst>
   </p:cSld>
@@ -4395,7 +4398,7 @@
     </p:spTree>
     <p:extLst>
       <p:ext uri="{BB962C8B-B14F-4D97-AF65-F5344CB8AC3E}">
-        <p14:creationId xmlns:p14="http://schemas.microsoft.com/office/powerpoint/2010/main" val="3919504541"/>
+        <p14:creationId xmlns:p14="http://schemas.microsoft.com/office/powerpoint/2010/main" val="2543381281"/>
       </p:ext>
     </p:extLst>
   </p:cSld>
@@ -4479,7 +4482,7 @@
     </p:spTree>
     <p:extLst>
       <p:ext uri="{BB962C8B-B14F-4D97-AF65-F5344CB8AC3E}">
-        <p14:creationId xmlns:p14="http://schemas.microsoft.com/office/powerpoint/2010/main" val="4110965509"/>
+        <p14:creationId xmlns:p14="http://schemas.microsoft.com/office/powerpoint/2010/main" val="3919504541"/>
       </p:ext>
     </p:extLst>
   </p:cSld>
@@ -4563,7 +4566,7 @@
     </p:spTree>
     <p:extLst>
       <p:ext uri="{BB962C8B-B14F-4D97-AF65-F5344CB8AC3E}">
-        <p14:creationId xmlns:p14="http://schemas.microsoft.com/office/powerpoint/2010/main" val="3121645829"/>
+        <p14:creationId xmlns:p14="http://schemas.microsoft.com/office/powerpoint/2010/main" val="4110965509"/>
       </p:ext>
     </p:extLst>
   </p:cSld>
@@ -4647,7 +4650,7 @@
     </p:spTree>
     <p:extLst>
       <p:ext uri="{BB962C8B-B14F-4D97-AF65-F5344CB8AC3E}">
-        <p14:creationId xmlns:p14="http://schemas.microsoft.com/office/powerpoint/2010/main" val="3025665009"/>
+        <p14:creationId xmlns:p14="http://schemas.microsoft.com/office/powerpoint/2010/main" val="3121645829"/>
       </p:ext>
     </p:extLst>
   </p:cSld>
@@ -4731,7 +4734,7 @@
     </p:spTree>
     <p:extLst>
       <p:ext uri="{BB962C8B-B14F-4D97-AF65-F5344CB8AC3E}">
-        <p14:creationId xmlns:p14="http://schemas.microsoft.com/office/powerpoint/2010/main" val="92700227"/>
+        <p14:creationId xmlns:p14="http://schemas.microsoft.com/office/powerpoint/2010/main" val="3025665009"/>
       </p:ext>
     </p:extLst>
   </p:cSld>
@@ -4815,7 +4818,7 @@
     </p:spTree>
     <p:extLst>
       <p:ext uri="{BB962C8B-B14F-4D97-AF65-F5344CB8AC3E}">
-        <p14:creationId xmlns:p14="http://schemas.microsoft.com/office/powerpoint/2010/main" val="912864036"/>
+        <p14:creationId xmlns:p14="http://schemas.microsoft.com/office/powerpoint/2010/main" val="92700227"/>
       </p:ext>
     </p:extLst>
   </p:cSld>
@@ -4899,7 +4902,7 @@
     </p:spTree>
     <p:extLst>
       <p:ext uri="{BB962C8B-B14F-4D97-AF65-F5344CB8AC3E}">
-        <p14:creationId xmlns:p14="http://schemas.microsoft.com/office/powerpoint/2010/main" val="11239400"/>
+        <p14:creationId xmlns:p14="http://schemas.microsoft.com/office/powerpoint/2010/main" val="912864036"/>
       </p:ext>
     </p:extLst>
   </p:cSld>
@@ -5127,7 +5130,7 @@
     </p:spTree>
     <p:extLst>
       <p:ext uri="{BB962C8B-B14F-4D97-AF65-F5344CB8AC3E}">
-        <p14:creationId xmlns:p14="http://schemas.microsoft.com/office/powerpoint/2010/main" val="3188299865"/>
+        <p14:creationId xmlns:p14="http://schemas.microsoft.com/office/powerpoint/2010/main" val="11239400"/>
       </p:ext>
     </p:extLst>
   </p:cSld>
@@ -5211,7 +5214,7 @@
     </p:spTree>
     <p:extLst>
       <p:ext uri="{BB962C8B-B14F-4D97-AF65-F5344CB8AC3E}">
-        <p14:creationId xmlns:p14="http://schemas.microsoft.com/office/powerpoint/2010/main" val="2649767047"/>
+        <p14:creationId xmlns:p14="http://schemas.microsoft.com/office/powerpoint/2010/main" val="3188299865"/>
       </p:ext>
     </p:extLst>
   </p:cSld>
@@ -5985,7 +5988,7 @@
           <a:p>
             <a:fld id="{8BBDE38F-7EFF-44D7-A4FC-86F4469E67EF}" type="datetimeFigureOut">
               <a:rPr lang="en-US" smtClean="0"/>
-              <a:t>25-May-22</a:t>
+              <a:t>08-Jun-22</a:t>
             </a:fld>
             <a:endParaRPr lang="en-US"/>
           </a:p>
@@ -6183,7 +6186,7 @@
           <a:p>
             <a:fld id="{8BBDE38F-7EFF-44D7-A4FC-86F4469E67EF}" type="datetimeFigureOut">
               <a:rPr lang="en-US" smtClean="0"/>
-              <a:t>25-May-22</a:t>
+              <a:t>08-Jun-22</a:t>
             </a:fld>
             <a:endParaRPr lang="en-US"/>
           </a:p>
@@ -6391,7 +6394,7 @@
           <a:p>
             <a:fld id="{8BBDE38F-7EFF-44D7-A4FC-86F4469E67EF}" type="datetimeFigureOut">
               <a:rPr lang="en-US" smtClean="0"/>
-              <a:t>25-May-22</a:t>
+              <a:t>08-Jun-22</a:t>
             </a:fld>
             <a:endParaRPr lang="en-US"/>
           </a:p>
@@ -6589,7 +6592,7 @@
           <a:p>
             <a:fld id="{8BBDE38F-7EFF-44D7-A4FC-86F4469E67EF}" type="datetimeFigureOut">
               <a:rPr lang="en-US" smtClean="0"/>
-              <a:t>25-May-22</a:t>
+              <a:t>08-Jun-22</a:t>
             </a:fld>
             <a:endParaRPr lang="en-US"/>
           </a:p>
@@ -6864,7 +6867,7 @@
           <a:p>
             <a:fld id="{8BBDE38F-7EFF-44D7-A4FC-86F4469E67EF}" type="datetimeFigureOut">
               <a:rPr lang="en-US" smtClean="0"/>
-              <a:t>25-May-22</a:t>
+              <a:t>08-Jun-22</a:t>
             </a:fld>
             <a:endParaRPr lang="en-US"/>
           </a:p>
@@ -7129,7 +7132,7 @@
           <a:p>
             <a:fld id="{8BBDE38F-7EFF-44D7-A4FC-86F4469E67EF}" type="datetimeFigureOut">
               <a:rPr lang="en-US" smtClean="0"/>
-              <a:t>25-May-22</a:t>
+              <a:t>08-Jun-22</a:t>
             </a:fld>
             <a:endParaRPr lang="en-US"/>
           </a:p>
@@ -7541,7 +7544,7 @@
           <a:p>
             <a:fld id="{8BBDE38F-7EFF-44D7-A4FC-86F4469E67EF}" type="datetimeFigureOut">
               <a:rPr lang="en-US" smtClean="0"/>
-              <a:t>25-May-22</a:t>
+              <a:t>08-Jun-22</a:t>
             </a:fld>
             <a:endParaRPr lang="en-US"/>
           </a:p>
@@ -7682,7 +7685,7 @@
           <a:p>
             <a:fld id="{8BBDE38F-7EFF-44D7-A4FC-86F4469E67EF}" type="datetimeFigureOut">
               <a:rPr lang="en-US" smtClean="0"/>
-              <a:t>25-May-22</a:t>
+              <a:t>08-Jun-22</a:t>
             </a:fld>
             <a:endParaRPr lang="en-US"/>
           </a:p>
@@ -7795,7 +7798,7 @@
           <a:p>
             <a:fld id="{8BBDE38F-7EFF-44D7-A4FC-86F4469E67EF}" type="datetimeFigureOut">
               <a:rPr lang="en-US" smtClean="0"/>
-              <a:t>25-May-22</a:t>
+              <a:t>08-Jun-22</a:t>
             </a:fld>
             <a:endParaRPr lang="en-US"/>
           </a:p>
@@ -8106,7 +8109,7 @@
           <a:p>
             <a:fld id="{8BBDE38F-7EFF-44D7-A4FC-86F4469E67EF}" type="datetimeFigureOut">
               <a:rPr lang="en-US" smtClean="0"/>
-              <a:t>25-May-22</a:t>
+              <a:t>08-Jun-22</a:t>
             </a:fld>
             <a:endParaRPr lang="en-US"/>
           </a:p>
@@ -8394,7 +8397,7 @@
           <a:p>
             <a:fld id="{8BBDE38F-7EFF-44D7-A4FC-86F4469E67EF}" type="datetimeFigureOut">
               <a:rPr lang="en-US" smtClean="0"/>
-              <a:t>25-May-22</a:t>
+              <a:t>08-Jun-22</a:t>
             </a:fld>
             <a:endParaRPr lang="en-US"/>
           </a:p>
@@ -8635,7 +8638,7 @@
           <a:p>
             <a:fld id="{8BBDE38F-7EFF-44D7-A4FC-86F4469E67EF}" type="datetimeFigureOut">
               <a:rPr lang="en-US" smtClean="0"/>
-              <a:t>25-May-22</a:t>
+              <a:t>08-Jun-22</a:t>
             </a:fld>
             <a:endParaRPr lang="en-US"/>
           </a:p>
@@ -13771,6 +13774,307 @@
           <a:chExt cx="0" cy="0"/>
         </a:xfrm>
       </p:grpSpPr>
+      <p:sp>
+        <p:nvSpPr>
+          <p:cNvPr id="2" name="Title 1">
+            <a:extLst>
+              <a:ext uri="{FF2B5EF4-FFF2-40B4-BE49-F238E27FC236}">
+                <a16:creationId xmlns:a16="http://schemas.microsoft.com/office/drawing/2014/main" id="{A26A8A0A-320E-4536-BFF8-C2E9FC542DEC}"/>
+              </a:ext>
+            </a:extLst>
+          </p:cNvPr>
+          <p:cNvSpPr>
+            <a:spLocks noGrp="1"/>
+          </p:cNvSpPr>
+          <p:nvPr>
+            <p:ph type="title"/>
+          </p:nvPr>
+        </p:nvSpPr>
+        <p:spPr/>
+        <p:txBody>
+          <a:bodyPr/>
+          <a:lstStyle/>
+          <a:p>
+            <a:r>
+              <a:rPr lang="en-US" dirty="0"/>
+              <a:t>Identity Access Management</a:t>
+            </a:r>
+          </a:p>
+        </p:txBody>
+      </p:sp>
+      <p:sp>
+        <p:nvSpPr>
+          <p:cNvPr id="3" name="Content Placeholder 2">
+            <a:extLst>
+              <a:ext uri="{FF2B5EF4-FFF2-40B4-BE49-F238E27FC236}">
+                <a16:creationId xmlns:a16="http://schemas.microsoft.com/office/drawing/2014/main" id="{AE3F0B5C-ACCE-4F53-A9D1-641797D8C52C}"/>
+              </a:ext>
+            </a:extLst>
+          </p:cNvPr>
+          <p:cNvSpPr>
+            <a:spLocks noGrp="1"/>
+          </p:cNvSpPr>
+          <p:nvPr>
+            <p:ph idx="1"/>
+          </p:nvPr>
+        </p:nvSpPr>
+        <p:spPr/>
+        <p:txBody>
+          <a:bodyPr/>
+          <a:lstStyle/>
+          <a:p>
+            <a:pPr marL="0" indent="0">
+              <a:buNone/>
+            </a:pPr>
+            <a:r>
+              <a:rPr lang="en-US" dirty="0">
+                <a:hlinkClick r:id="rId3"/>
+              </a:rPr>
+              <a:t>Azure RBAC explained</a:t>
+            </a:r>
+            <a:endParaRPr lang="en-US" i="1" dirty="0"/>
+          </a:p>
+          <a:p>
+            <a:pPr marL="0" indent="0">
+              <a:buNone/>
+            </a:pPr>
+            <a:endParaRPr lang="en-US" dirty="0"/>
+          </a:p>
+        </p:txBody>
+      </p:sp>
+    </p:spTree>
+    <p:extLst>
+      <p:ext uri="{BB962C8B-B14F-4D97-AF65-F5344CB8AC3E}">
+        <p14:creationId xmlns:p14="http://schemas.microsoft.com/office/powerpoint/2010/main" val="3708815563"/>
+      </p:ext>
+    </p:extLst>
+  </p:cSld>
+  <p:clrMapOvr>
+    <a:masterClrMapping/>
+  </p:clrMapOvr>
+</p:sld>
+</file>
+
+<file path=ppt/slides/slide5.xml><?xml version="1.0" encoding="utf-8"?>
+<p:sld xmlns:a="http://schemas.openxmlformats.org/drawingml/2006/main" xmlns:r="http://schemas.openxmlformats.org/officeDocument/2006/relationships" xmlns:p="http://schemas.openxmlformats.org/presentationml/2006/main">
+  <p:cSld>
+    <p:spTree>
+      <p:nvGrpSpPr>
+        <p:cNvPr id="1" name=""/>
+        <p:cNvGrpSpPr/>
+        <p:nvPr/>
+      </p:nvGrpSpPr>
+      <p:grpSpPr>
+        <a:xfrm>
+          <a:off x="0" y="0"/>
+          <a:ext cx="0" cy="0"/>
+          <a:chOff x="0" y="0"/>
+          <a:chExt cx="0" cy="0"/>
+        </a:xfrm>
+      </p:grpSpPr>
+      <p:sp>
+        <p:nvSpPr>
+          <p:cNvPr id="2" name="Title 1">
+            <a:extLst>
+              <a:ext uri="{FF2B5EF4-FFF2-40B4-BE49-F238E27FC236}">
+                <a16:creationId xmlns:a16="http://schemas.microsoft.com/office/drawing/2014/main" id="{A26A8A0A-320E-4536-BFF8-C2E9FC542DEC}"/>
+              </a:ext>
+            </a:extLst>
+          </p:cNvPr>
+          <p:cNvSpPr>
+            <a:spLocks noGrp="1"/>
+          </p:cNvSpPr>
+          <p:nvPr>
+            <p:ph type="title"/>
+          </p:nvPr>
+        </p:nvSpPr>
+        <p:spPr/>
+        <p:txBody>
+          <a:bodyPr/>
+          <a:lstStyle/>
+          <a:p>
+            <a:r>
+              <a:rPr lang="en-US" dirty="0"/>
+              <a:t>Breach scenarios</a:t>
+            </a:r>
+          </a:p>
+        </p:txBody>
+      </p:sp>
+      <p:sp>
+        <p:nvSpPr>
+          <p:cNvPr id="3" name="Content Placeholder 2">
+            <a:extLst>
+              <a:ext uri="{FF2B5EF4-FFF2-40B4-BE49-F238E27FC236}">
+                <a16:creationId xmlns:a16="http://schemas.microsoft.com/office/drawing/2014/main" id="{AE3F0B5C-ACCE-4F53-A9D1-641797D8C52C}"/>
+              </a:ext>
+            </a:extLst>
+          </p:cNvPr>
+          <p:cNvSpPr>
+            <a:spLocks noGrp="1"/>
+          </p:cNvSpPr>
+          <p:nvPr>
+            <p:ph idx="1"/>
+          </p:nvPr>
+        </p:nvSpPr>
+        <p:spPr/>
+        <p:txBody>
+          <a:bodyPr/>
+          <a:lstStyle/>
+          <a:p>
+            <a:pPr marL="0" indent="0">
+              <a:buNone/>
+            </a:pPr>
+            <a:r>
+              <a:rPr lang="en-US" b="1" dirty="0"/>
+              <a:t>Ransomware</a:t>
+            </a:r>
+            <a:r>
+              <a:rPr lang="en-US" dirty="0"/>
+              <a:t>: threat to publish data or blocks access</a:t>
+            </a:r>
+          </a:p>
+        </p:txBody>
+      </p:sp>
+      <p:pic>
+        <p:nvPicPr>
+          <p:cNvPr id="5" name="Picture 4">
+            <a:extLst>
+              <a:ext uri="{FF2B5EF4-FFF2-40B4-BE49-F238E27FC236}">
+                <a16:creationId xmlns:a16="http://schemas.microsoft.com/office/drawing/2014/main" id="{1C00CA82-98E5-4B14-A49B-0E7A736405D5}"/>
+              </a:ext>
+            </a:extLst>
+          </p:cNvPr>
+          <p:cNvPicPr>
+            <a:picLocks noChangeAspect="1"/>
+          </p:cNvPicPr>
+          <p:nvPr/>
+        </p:nvPicPr>
+        <p:blipFill>
+          <a:blip r:embed="rId3"/>
+          <a:stretch>
+            <a:fillRect/>
+          </a:stretch>
+        </p:blipFill>
+        <p:spPr>
+          <a:xfrm>
+            <a:off x="1761520" y="2880853"/>
+            <a:ext cx="8668960" cy="3296110"/>
+          </a:xfrm>
+          <a:prstGeom prst="rect">
+            <a:avLst/>
+          </a:prstGeom>
+        </p:spPr>
+      </p:pic>
+      <p:sp>
+        <p:nvSpPr>
+          <p:cNvPr id="6" name="TextBox 5">
+            <a:extLst>
+              <a:ext uri="{FF2B5EF4-FFF2-40B4-BE49-F238E27FC236}">
+                <a16:creationId xmlns:a16="http://schemas.microsoft.com/office/drawing/2014/main" id="{A00EB3DF-681E-4492-AA52-2EAF5B70531C}"/>
+              </a:ext>
+            </a:extLst>
+          </p:cNvPr>
+          <p:cNvSpPr txBox="1"/>
+          <p:nvPr/>
+        </p:nvSpPr>
+        <p:spPr>
+          <a:xfrm>
+            <a:off x="3429816" y="6311900"/>
+            <a:ext cx="8668960" cy="307777"/>
+          </a:xfrm>
+          <a:prstGeom prst="rect">
+            <a:avLst/>
+          </a:prstGeom>
+          <a:noFill/>
+        </p:spPr>
+        <p:txBody>
+          <a:bodyPr wrap="square">
+            <a:spAutoFit/>
+          </a:bodyPr>
+          <a:lstStyle/>
+          <a:p>
+            <a:pPr marL="0" marR="0" lvl="0" indent="0" algn="l" defTabSz="914400" rtl="0" eaLnBrk="1" fontAlgn="auto" latinLnBrk="0" hangingPunct="1">
+              <a:lnSpc>
+                <a:spcPct val="100000"/>
+              </a:lnSpc>
+              <a:spcBef>
+                <a:spcPts val="0"/>
+              </a:spcBef>
+              <a:spcAft>
+                <a:spcPts val="0"/>
+              </a:spcAft>
+              <a:buClrTx/>
+              <a:buSzTx/>
+              <a:buFontTx/>
+              <a:buNone/>
+              <a:tabLst/>
+              <a:defRPr/>
+            </a:pPr>
+            <a:r>
+              <a:rPr kumimoji="0" lang="en-US" sz="1400" b="0" i="0" u="none" strike="noStrike" kern="1200" cap="none" spc="0" normalizeH="0" baseline="0" noProof="0" dirty="0">
+                <a:ln>
+                  <a:noFill/>
+                </a:ln>
+                <a:solidFill>
+                  <a:prstClr val="black"/>
+                </a:solidFill>
+                <a:effectLst/>
+                <a:uLnTx/>
+                <a:uFillTx/>
+                <a:latin typeface="Calibri" panose="020F0502020204030204"/>
+                <a:ea typeface="+mn-ea"/>
+                <a:cs typeface="+mn-cs"/>
+                <a:hlinkClick r:id="rId4"/>
+              </a:rPr>
+              <a:t>https://www.theverge.com/2020/8/4/21353842/garmin-ransomware-attack-wearables-wastedlocker-evil-corp</a:t>
+            </a:r>
+            <a:endParaRPr kumimoji="0" lang="en-US" sz="1400" b="0" i="0" u="none" strike="noStrike" kern="1200" cap="none" spc="0" normalizeH="0" baseline="0" noProof="0" dirty="0">
+              <a:ln>
+                <a:noFill/>
+              </a:ln>
+              <a:solidFill>
+                <a:prstClr val="black"/>
+              </a:solidFill>
+              <a:effectLst/>
+              <a:uLnTx/>
+              <a:uFillTx/>
+              <a:latin typeface="Calibri" panose="020F0502020204030204"/>
+              <a:ea typeface="+mn-ea"/>
+              <a:cs typeface="+mn-cs"/>
+            </a:endParaRPr>
+          </a:p>
+        </p:txBody>
+      </p:sp>
+    </p:spTree>
+    <p:extLst>
+      <p:ext uri="{BB962C8B-B14F-4D97-AF65-F5344CB8AC3E}">
+        <p14:creationId xmlns:p14="http://schemas.microsoft.com/office/powerpoint/2010/main" val="336106310"/>
+      </p:ext>
+    </p:extLst>
+  </p:cSld>
+  <p:clrMapOvr>
+    <a:masterClrMapping/>
+  </p:clrMapOvr>
+</p:sld>
+</file>
+
+<file path=ppt/slides/slide50.xml><?xml version="1.0" encoding="utf-8"?>
+<p:sld xmlns:a="http://schemas.openxmlformats.org/drawingml/2006/main" xmlns:r="http://schemas.openxmlformats.org/officeDocument/2006/relationships" xmlns:p="http://schemas.openxmlformats.org/presentationml/2006/main">
+  <p:cSld>
+    <p:spTree>
+      <p:nvGrpSpPr>
+        <p:cNvPr id="1" name=""/>
+        <p:cNvGrpSpPr/>
+        <p:nvPr/>
+      </p:nvGrpSpPr>
+      <p:grpSpPr>
+        <a:xfrm>
+          <a:off x="0" y="0"/>
+          <a:ext cx="0" cy="0"/>
+          <a:chOff x="0" y="0"/>
+          <a:chExt cx="0" cy="0"/>
+        </a:xfrm>
+      </p:grpSpPr>
       <p:pic>
         <p:nvPicPr>
           <p:cNvPr id="5" name="Picture 4">
@@ -13814,210 +14118,7 @@
 </p:sld>
 </file>
 
-<file path=ppt/slides/slide5.xml><?xml version="1.0" encoding="utf-8"?>
-<p:sld xmlns:a="http://schemas.openxmlformats.org/drawingml/2006/main" xmlns:r="http://schemas.openxmlformats.org/officeDocument/2006/relationships" xmlns:p="http://schemas.openxmlformats.org/presentationml/2006/main">
-  <p:cSld>
-    <p:spTree>
-      <p:nvGrpSpPr>
-        <p:cNvPr id="1" name=""/>
-        <p:cNvGrpSpPr/>
-        <p:nvPr/>
-      </p:nvGrpSpPr>
-      <p:grpSpPr>
-        <a:xfrm>
-          <a:off x="0" y="0"/>
-          <a:ext cx="0" cy="0"/>
-          <a:chOff x="0" y="0"/>
-          <a:chExt cx="0" cy="0"/>
-        </a:xfrm>
-      </p:grpSpPr>
-      <p:sp>
-        <p:nvSpPr>
-          <p:cNvPr id="2" name="Title 1">
-            <a:extLst>
-              <a:ext uri="{FF2B5EF4-FFF2-40B4-BE49-F238E27FC236}">
-                <a16:creationId xmlns:a16="http://schemas.microsoft.com/office/drawing/2014/main" id="{A26A8A0A-320E-4536-BFF8-C2E9FC542DEC}"/>
-              </a:ext>
-            </a:extLst>
-          </p:cNvPr>
-          <p:cNvSpPr>
-            <a:spLocks noGrp="1"/>
-          </p:cNvSpPr>
-          <p:nvPr>
-            <p:ph type="title"/>
-          </p:nvPr>
-        </p:nvSpPr>
-        <p:spPr/>
-        <p:txBody>
-          <a:bodyPr/>
-          <a:lstStyle/>
-          <a:p>
-            <a:r>
-              <a:rPr lang="en-US" dirty="0"/>
-              <a:t>Breach scenarios</a:t>
-            </a:r>
-          </a:p>
-        </p:txBody>
-      </p:sp>
-      <p:sp>
-        <p:nvSpPr>
-          <p:cNvPr id="3" name="Content Placeholder 2">
-            <a:extLst>
-              <a:ext uri="{FF2B5EF4-FFF2-40B4-BE49-F238E27FC236}">
-                <a16:creationId xmlns:a16="http://schemas.microsoft.com/office/drawing/2014/main" id="{AE3F0B5C-ACCE-4F53-A9D1-641797D8C52C}"/>
-              </a:ext>
-            </a:extLst>
-          </p:cNvPr>
-          <p:cNvSpPr>
-            <a:spLocks noGrp="1"/>
-          </p:cNvSpPr>
-          <p:nvPr>
-            <p:ph idx="1"/>
-          </p:nvPr>
-        </p:nvSpPr>
-        <p:spPr/>
-        <p:txBody>
-          <a:bodyPr/>
-          <a:lstStyle/>
-          <a:p>
-            <a:pPr marL="0" indent="0">
-              <a:buNone/>
-            </a:pPr>
-            <a:r>
-              <a:rPr lang="en-US" b="1" dirty="0"/>
-              <a:t>Ransomware</a:t>
-            </a:r>
-            <a:r>
-              <a:rPr lang="en-US" dirty="0"/>
-              <a:t>: threat to publish data or blocks access</a:t>
-            </a:r>
-          </a:p>
-        </p:txBody>
-      </p:sp>
-      <p:pic>
-        <p:nvPicPr>
-          <p:cNvPr id="5" name="Picture 4">
-            <a:extLst>
-              <a:ext uri="{FF2B5EF4-FFF2-40B4-BE49-F238E27FC236}">
-                <a16:creationId xmlns:a16="http://schemas.microsoft.com/office/drawing/2014/main" id="{1C00CA82-98E5-4B14-A49B-0E7A736405D5}"/>
-              </a:ext>
-            </a:extLst>
-          </p:cNvPr>
-          <p:cNvPicPr>
-            <a:picLocks noChangeAspect="1"/>
-          </p:cNvPicPr>
-          <p:nvPr/>
-        </p:nvPicPr>
-        <p:blipFill>
-          <a:blip r:embed="rId3"/>
-          <a:stretch>
-            <a:fillRect/>
-          </a:stretch>
-        </p:blipFill>
-        <p:spPr>
-          <a:xfrm>
-            <a:off x="1761520" y="2880853"/>
-            <a:ext cx="8668960" cy="3296110"/>
-          </a:xfrm>
-          <a:prstGeom prst="rect">
-            <a:avLst/>
-          </a:prstGeom>
-        </p:spPr>
-      </p:pic>
-      <p:sp>
-        <p:nvSpPr>
-          <p:cNvPr id="6" name="TextBox 5">
-            <a:extLst>
-              <a:ext uri="{FF2B5EF4-FFF2-40B4-BE49-F238E27FC236}">
-                <a16:creationId xmlns:a16="http://schemas.microsoft.com/office/drawing/2014/main" id="{A00EB3DF-681E-4492-AA52-2EAF5B70531C}"/>
-              </a:ext>
-            </a:extLst>
-          </p:cNvPr>
-          <p:cNvSpPr txBox="1"/>
-          <p:nvPr/>
-        </p:nvSpPr>
-        <p:spPr>
-          <a:xfrm>
-            <a:off x="3429816" y="6311900"/>
-            <a:ext cx="8668960" cy="307777"/>
-          </a:xfrm>
-          <a:prstGeom prst="rect">
-            <a:avLst/>
-          </a:prstGeom>
-          <a:noFill/>
-        </p:spPr>
-        <p:txBody>
-          <a:bodyPr wrap="square">
-            <a:spAutoFit/>
-          </a:bodyPr>
-          <a:lstStyle/>
-          <a:p>
-            <a:pPr marL="0" marR="0" lvl="0" indent="0" algn="l" defTabSz="914400" rtl="0" eaLnBrk="1" fontAlgn="auto" latinLnBrk="0" hangingPunct="1">
-              <a:lnSpc>
-                <a:spcPct val="100000"/>
-              </a:lnSpc>
-              <a:spcBef>
-                <a:spcPts val="0"/>
-              </a:spcBef>
-              <a:spcAft>
-                <a:spcPts val="0"/>
-              </a:spcAft>
-              <a:buClrTx/>
-              <a:buSzTx/>
-              <a:buFontTx/>
-              <a:buNone/>
-              <a:tabLst/>
-              <a:defRPr/>
-            </a:pPr>
-            <a:r>
-              <a:rPr kumimoji="0" lang="en-US" sz="1400" b="0" i="0" u="none" strike="noStrike" kern="1200" cap="none" spc="0" normalizeH="0" baseline="0" noProof="0" dirty="0">
-                <a:ln>
-                  <a:noFill/>
-                </a:ln>
-                <a:solidFill>
-                  <a:prstClr val="black"/>
-                </a:solidFill>
-                <a:effectLst/>
-                <a:uLnTx/>
-                <a:uFillTx/>
-                <a:latin typeface="Calibri" panose="020F0502020204030204"/>
-                <a:ea typeface="+mn-ea"/>
-                <a:cs typeface="+mn-cs"/>
-                <a:hlinkClick r:id="rId4"/>
-              </a:rPr>
-              <a:t>https://www.theverge.com/2020/8/4/21353842/garmin-ransomware-attack-wearables-wastedlocker-evil-corp</a:t>
-            </a:r>
-            <a:endParaRPr kumimoji="0" lang="en-US" sz="1400" b="0" i="0" u="none" strike="noStrike" kern="1200" cap="none" spc="0" normalizeH="0" baseline="0" noProof="0" dirty="0">
-              <a:ln>
-                <a:noFill/>
-              </a:ln>
-              <a:solidFill>
-                <a:prstClr val="black"/>
-              </a:solidFill>
-              <a:effectLst/>
-              <a:uLnTx/>
-              <a:uFillTx/>
-              <a:latin typeface="Calibri" panose="020F0502020204030204"/>
-              <a:ea typeface="+mn-ea"/>
-              <a:cs typeface="+mn-cs"/>
-            </a:endParaRPr>
-          </a:p>
-        </p:txBody>
-      </p:sp>
-    </p:spTree>
-    <p:extLst>
-      <p:ext uri="{BB962C8B-B14F-4D97-AF65-F5344CB8AC3E}">
-        <p14:creationId xmlns:p14="http://schemas.microsoft.com/office/powerpoint/2010/main" val="336106310"/>
-      </p:ext>
-    </p:extLst>
-  </p:cSld>
-  <p:clrMapOvr>
-    <a:masterClrMapping/>
-  </p:clrMapOvr>
-</p:sld>
-</file>
-
-<file path=ppt/slides/slide50.xml><?xml version="1.0" encoding="utf-8"?>
+<file path=ppt/slides/slide51.xml><?xml version="1.0" encoding="utf-8"?>
 <p:sld xmlns:a="http://schemas.openxmlformats.org/drawingml/2006/main" xmlns:r="http://schemas.openxmlformats.org/officeDocument/2006/relationships" xmlns:p="http://schemas.openxmlformats.org/presentationml/2006/main">
   <p:cSld>
     <p:spTree>
@@ -14077,104 +14178,6 @@
 </p:sld>
 </file>
 
-<file path=ppt/slides/slide51.xml><?xml version="1.0" encoding="utf-8"?>
-<p:sld xmlns:a="http://schemas.openxmlformats.org/drawingml/2006/main" xmlns:r="http://schemas.openxmlformats.org/officeDocument/2006/relationships" xmlns:p="http://schemas.openxmlformats.org/presentationml/2006/main">
-  <p:cSld>
-    <p:spTree>
-      <p:nvGrpSpPr>
-        <p:cNvPr id="1" name=""/>
-        <p:cNvGrpSpPr/>
-        <p:nvPr/>
-      </p:nvGrpSpPr>
-      <p:grpSpPr>
-        <a:xfrm>
-          <a:off x="0" y="0"/>
-          <a:ext cx="0" cy="0"/>
-          <a:chOff x="0" y="0"/>
-          <a:chExt cx="0" cy="0"/>
-        </a:xfrm>
-      </p:grpSpPr>
-      <p:sp>
-        <p:nvSpPr>
-          <p:cNvPr id="2" name="Title 1">
-            <a:extLst>
-              <a:ext uri="{FF2B5EF4-FFF2-40B4-BE49-F238E27FC236}">
-                <a16:creationId xmlns:a16="http://schemas.microsoft.com/office/drawing/2014/main" id="{A26A8A0A-320E-4536-BFF8-C2E9FC542DEC}"/>
-              </a:ext>
-            </a:extLst>
-          </p:cNvPr>
-          <p:cNvSpPr>
-            <a:spLocks noGrp="1"/>
-          </p:cNvSpPr>
-          <p:nvPr>
-            <p:ph type="title"/>
-          </p:nvPr>
-        </p:nvSpPr>
-        <p:spPr/>
-        <p:txBody>
-          <a:bodyPr/>
-          <a:lstStyle/>
-          <a:p>
-            <a:r>
-              <a:rPr lang="en-US" dirty="0"/>
-              <a:t>Identity Access Management</a:t>
-            </a:r>
-          </a:p>
-        </p:txBody>
-      </p:sp>
-      <p:sp>
-        <p:nvSpPr>
-          <p:cNvPr id="3" name="Content Placeholder 2">
-            <a:extLst>
-              <a:ext uri="{FF2B5EF4-FFF2-40B4-BE49-F238E27FC236}">
-                <a16:creationId xmlns:a16="http://schemas.microsoft.com/office/drawing/2014/main" id="{AE3F0B5C-ACCE-4F53-A9D1-641797D8C52C}"/>
-              </a:ext>
-            </a:extLst>
-          </p:cNvPr>
-          <p:cNvSpPr>
-            <a:spLocks noGrp="1"/>
-          </p:cNvSpPr>
-          <p:nvPr>
-            <p:ph idx="1"/>
-          </p:nvPr>
-        </p:nvSpPr>
-        <p:spPr/>
-        <p:txBody>
-          <a:bodyPr/>
-          <a:lstStyle/>
-          <a:p>
-            <a:pPr marL="0" indent="0">
-              <a:buNone/>
-            </a:pPr>
-            <a:r>
-              <a:rPr lang="en-US" dirty="0">
-                <a:hlinkClick r:id="rId3"/>
-              </a:rPr>
-              <a:t>Azure RBAC explained</a:t>
-            </a:r>
-            <a:endParaRPr lang="en-US" i="1" dirty="0"/>
-          </a:p>
-          <a:p>
-            <a:pPr marL="0" indent="0">
-              <a:buNone/>
-            </a:pPr>
-            <a:endParaRPr lang="en-US" dirty="0"/>
-          </a:p>
-        </p:txBody>
-      </p:sp>
-    </p:spTree>
-    <p:extLst>
-      <p:ext uri="{BB962C8B-B14F-4D97-AF65-F5344CB8AC3E}">
-        <p14:creationId xmlns:p14="http://schemas.microsoft.com/office/powerpoint/2010/main" val="3708815563"/>
-      </p:ext>
-    </p:extLst>
-  </p:cSld>
-  <p:clrMapOvr>
-    <a:masterClrMapping/>
-  </p:clrMapOvr>
-</p:sld>
-</file>
-
 <file path=ppt/slides/slide52.xml><?xml version="1.0" encoding="utf-8"?>
 <p:sld xmlns:a="http://schemas.openxmlformats.org/drawingml/2006/main" xmlns:r="http://schemas.openxmlformats.org/officeDocument/2006/relationships" xmlns:p="http://schemas.openxmlformats.org/presentationml/2006/main">
   <p:cSld>
@@ -14245,16 +14248,31 @@
               <a:buNone/>
             </a:pPr>
             <a:r>
-              <a:rPr lang="en-US" dirty="0"/>
-              <a:t>Authentication – verification that an identity is who/what they claims</a:t>
-            </a:r>
+              <a:rPr lang="it-IT" dirty="0" err="1">
+                <a:hlinkClick r:id="rId3"/>
+              </a:rPr>
+              <a:t>ACLs</a:t>
+            </a:r>
+            <a:r>
+              <a:rPr lang="it-IT" dirty="0">
+                <a:hlinkClick r:id="rId3"/>
+              </a:rPr>
+              <a:t> in Azure Data Lake</a:t>
+            </a:r>
+            <a:endParaRPr lang="en-US" i="1" dirty="0"/>
+          </a:p>
+          <a:p>
+            <a:pPr marL="0" indent="0">
+              <a:buNone/>
+            </a:pPr>
+            <a:endParaRPr lang="en-US" dirty="0"/>
           </a:p>
         </p:txBody>
       </p:sp>
     </p:spTree>
     <p:extLst>
       <p:ext uri="{BB962C8B-B14F-4D97-AF65-F5344CB8AC3E}">
-        <p14:creationId xmlns:p14="http://schemas.microsoft.com/office/powerpoint/2010/main" val="304570901"/>
+        <p14:creationId xmlns:p14="http://schemas.microsoft.com/office/powerpoint/2010/main" val="3096526342"/>
       </p:ext>
     </p:extLst>
   </p:cSld>
@@ -14335,39 +14353,7 @@
             </a:pPr>
             <a:r>
               <a:rPr lang="en-US" dirty="0"/>
-              <a:t>Authentication could be based on</a:t>
-            </a:r>
-          </a:p>
-          <a:p>
-            <a:r>
-              <a:rPr lang="en-US" dirty="0"/>
-              <a:t>Password</a:t>
-            </a:r>
-          </a:p>
-          <a:p>
-            <a:r>
-              <a:rPr lang="en-US" dirty="0"/>
-              <a:t>Certificate</a:t>
-            </a:r>
-          </a:p>
-          <a:p>
-            <a:r>
-              <a:rPr lang="en-US" dirty="0"/>
-              <a:t>Token</a:t>
-            </a:r>
-          </a:p>
-          <a:p>
-            <a:r>
-              <a:rPr lang="en-US" dirty="0"/>
-              <a:t>Biometrics (fingerprint, face identification, </a:t>
-            </a:r>
-            <a:r>
-              <a:rPr lang="en-US" dirty="0" err="1"/>
-              <a:t>etc</a:t>
-            </a:r>
-            <a:r>
-              <a:rPr lang="en-US" dirty="0"/>
-              <a:t>)</a:t>
+              <a:t>Authentication – verification that an identity is who/what they claims</a:t>
             </a:r>
           </a:p>
         </p:txBody>
@@ -14375,7 +14361,7 @@
     </p:spTree>
     <p:extLst>
       <p:ext uri="{BB962C8B-B14F-4D97-AF65-F5344CB8AC3E}">
-        <p14:creationId xmlns:p14="http://schemas.microsoft.com/office/powerpoint/2010/main" val="1792375183"/>
+        <p14:creationId xmlns:p14="http://schemas.microsoft.com/office/powerpoint/2010/main" val="304570901"/>
       </p:ext>
     </p:extLst>
   </p:cSld>
@@ -14456,20 +14442,47 @@
             </a:pPr>
             <a:r>
               <a:rPr lang="en-US" dirty="0"/>
-              <a:t>Authorization – verify that exact identity is permitted to perform </a:t>
-            </a:r>
-            <a:r>
-              <a:rPr lang="en-US"/>
-              <a:t>an operation</a:t>
-            </a:r>
-            <a:endParaRPr lang="en-US" dirty="0"/>
+              <a:t>Authentication could be based on</a:t>
+            </a:r>
+          </a:p>
+          <a:p>
+            <a:r>
+              <a:rPr lang="en-US" dirty="0"/>
+              <a:t>Password</a:t>
+            </a:r>
+          </a:p>
+          <a:p>
+            <a:r>
+              <a:rPr lang="en-US" dirty="0"/>
+              <a:t>Certificate</a:t>
+            </a:r>
+          </a:p>
+          <a:p>
+            <a:r>
+              <a:rPr lang="en-US" dirty="0"/>
+              <a:t>Token</a:t>
+            </a:r>
+          </a:p>
+          <a:p>
+            <a:r>
+              <a:rPr lang="en-US" dirty="0"/>
+              <a:t>Biometrics (fingerprint, face identification, </a:t>
+            </a:r>
+            <a:r>
+              <a:rPr lang="en-US" dirty="0" err="1"/>
+              <a:t>etc</a:t>
+            </a:r>
+            <a:r>
+              <a:rPr lang="en-US" dirty="0"/>
+              <a:t>)</a:t>
+            </a:r>
           </a:p>
         </p:txBody>
       </p:sp>
     </p:spTree>
     <p:extLst>
       <p:ext uri="{BB962C8B-B14F-4D97-AF65-F5344CB8AC3E}">
-        <p14:creationId xmlns:p14="http://schemas.microsoft.com/office/powerpoint/2010/main" val="401564871"/>
+        <p14:creationId xmlns:p14="http://schemas.microsoft.com/office/powerpoint/2010/main" val="1792375183"/>
       </p:ext>
     </p:extLst>
   </p:cSld>
@@ -14549,33 +14562,13 @@
               <a:buNone/>
             </a:pPr>
             <a:r>
-              <a:rPr lang="en-US" i="1" dirty="0"/>
-              <a:t>SAML</a:t>
-            </a:r>
-            <a:r>
-              <a:rPr lang="en-US" dirty="0"/>
-              <a:t> </a:t>
-            </a:r>
-          </a:p>
-          <a:p>
-            <a:r>
-              <a:rPr lang="en-US" dirty="0"/>
-              <a:t>Open standard to exchange authentication and authorization data. </a:t>
-            </a:r>
-          </a:p>
-          <a:p>
-            <a:r>
-              <a:rPr lang="en-US" dirty="0"/>
-              <a:t>First published in 2001, SAML 2.0 in 2005</a:t>
-            </a:r>
-          </a:p>
-          <a:p>
-            <a:r>
-              <a:rPr lang="en-US" dirty="0"/>
-              <a:t>XML-based markup + protocol</a:t>
-            </a:r>
-          </a:p>
-          <a:p>
+              <a:rPr lang="en-US" dirty="0"/>
+              <a:t>Authorization – verify that exact identity is permitted to perform </a:t>
+            </a:r>
+            <a:r>
+              <a:rPr lang="en-US"/>
+              <a:t>an operation</a:t>
+            </a:r>
             <a:endParaRPr lang="en-US" dirty="0"/>
           </a:p>
         </p:txBody>
@@ -14583,7 +14576,7 @@
     </p:spTree>
     <p:extLst>
       <p:ext uri="{BB962C8B-B14F-4D97-AF65-F5344CB8AC3E}">
-        <p14:creationId xmlns:p14="http://schemas.microsoft.com/office/powerpoint/2010/main" val="387050328"/>
+        <p14:creationId xmlns:p14="http://schemas.microsoft.com/office/powerpoint/2010/main" val="401564871"/>
       </p:ext>
     </p:extLst>
   </p:cSld>
@@ -14664,32 +14657,32 @@
             </a:pPr>
             <a:r>
               <a:rPr lang="en-US" i="1" dirty="0"/>
-              <a:t>OAuth</a:t>
-            </a:r>
-            <a:endParaRPr lang="en-US" dirty="0"/>
-          </a:p>
-          <a:p>
-            <a:r>
-              <a:rPr lang="en-US" dirty="0"/>
-              <a:t>Open standard to delegate access [authorization]</a:t>
-            </a:r>
-          </a:p>
-          <a:p>
-            <a:r>
-              <a:rPr lang="en-US" dirty="0"/>
-              <a:t>First published in 2006</a:t>
-            </a:r>
-          </a:p>
-          <a:p>
-            <a:r>
-              <a:rPr lang="en-US" dirty="0"/>
-              <a:t>OAuth 2.0 published in 2012</a:t>
-            </a:r>
-          </a:p>
-          <a:p>
-            <a:pPr marL="0" indent="0">
-              <a:buNone/>
-            </a:pPr>
+              <a:t>SAML</a:t>
+            </a:r>
+            <a:r>
+              <a:rPr lang="en-US" dirty="0"/>
+              <a:t> </a:t>
+            </a:r>
+          </a:p>
+          <a:p>
+            <a:r>
+              <a:rPr lang="en-US" dirty="0"/>
+              <a:t>Open standard to exchange authentication and authorization data. </a:t>
+            </a:r>
+          </a:p>
+          <a:p>
+            <a:r>
+              <a:rPr lang="en-US" dirty="0"/>
+              <a:t>First published in 2001, SAML 2.0 in 2005</a:t>
+            </a:r>
+          </a:p>
+          <a:p>
+            <a:r>
+              <a:rPr lang="en-US" dirty="0"/>
+              <a:t>XML-based markup + protocol</a:t>
+            </a:r>
+          </a:p>
+          <a:p>
             <a:endParaRPr lang="en-US" dirty="0"/>
           </a:p>
         </p:txBody>
@@ -14697,7 +14690,7 @@
     </p:spTree>
     <p:extLst>
       <p:ext uri="{BB962C8B-B14F-4D97-AF65-F5344CB8AC3E}">
-        <p14:creationId xmlns:p14="http://schemas.microsoft.com/office/powerpoint/2010/main" val="172644186"/>
+        <p14:creationId xmlns:p14="http://schemas.microsoft.com/office/powerpoint/2010/main" val="387050328"/>
       </p:ext>
     </p:extLst>
   </p:cSld>
@@ -14778,32 +14771,40 @@
             </a:pPr>
             <a:r>
               <a:rPr lang="en-US" i="1" dirty="0"/>
-              <a:t>OpenID</a:t>
-            </a:r>
-            <a:r>
-              <a:rPr lang="en-US" dirty="0"/>
-              <a:t> – authentication protocol first published in 2006.</a:t>
+              <a:t>OAuth</a:t>
+            </a:r>
+            <a:endParaRPr lang="en-US" dirty="0"/>
+          </a:p>
+          <a:p>
+            <a:r>
+              <a:rPr lang="en-US" dirty="0"/>
+              <a:t>Open standard to delegate access [authorization]</a:t>
+            </a:r>
+          </a:p>
+          <a:p>
+            <a:r>
+              <a:rPr lang="en-US" dirty="0"/>
+              <a:t>First published in 2006</a:t>
+            </a:r>
+          </a:p>
+          <a:p>
+            <a:r>
+              <a:rPr lang="en-US" dirty="0"/>
+              <a:t>OAuth 2.0 published in 2012</a:t>
             </a:r>
           </a:p>
           <a:p>
             <a:pPr marL="0" indent="0">
               <a:buNone/>
             </a:pPr>
-            <a:r>
-              <a:rPr lang="en-US" i="1" dirty="0"/>
-              <a:t>OpenID Connect (OIDC)</a:t>
-            </a:r>
-            <a:r>
-              <a:rPr lang="en-US" dirty="0"/>
-              <a:t> – the third version of OpenID protocol, published in 2014</a:t>
-            </a:r>
+            <a:endParaRPr lang="en-US" dirty="0"/>
           </a:p>
         </p:txBody>
       </p:sp>
     </p:spTree>
     <p:extLst>
       <p:ext uri="{BB962C8B-B14F-4D97-AF65-F5344CB8AC3E}">
-        <p14:creationId xmlns:p14="http://schemas.microsoft.com/office/powerpoint/2010/main" val="4048307857"/>
+        <p14:creationId xmlns:p14="http://schemas.microsoft.com/office/powerpoint/2010/main" val="172644186"/>
       </p:ext>
     </p:extLst>
   </p:cSld>
@@ -14883,46 +14884,25 @@
               <a:buNone/>
             </a:pPr>
             <a:r>
-              <a:rPr lang="en-US" dirty="0"/>
-              <a:t>OAuth 2.0 is only for authorization</a:t>
+              <a:rPr lang="en-US" i="1" dirty="0"/>
+              <a:t>OpenID</a:t>
+            </a:r>
+            <a:r>
+              <a:rPr lang="en-US" dirty="0"/>
+              <a:t> – authentication protocol first published in 2006.</a:t>
             </a:r>
           </a:p>
           <a:p>
             <a:pPr marL="0" indent="0">
               <a:buNone/>
             </a:pPr>
-            <a:endParaRPr lang="en-US" dirty="0"/>
-          </a:p>
-          <a:p>
-            <a:pPr marL="0" indent="0">
-              <a:buNone/>
-            </a:pPr>
-            <a:r>
-              <a:rPr lang="en-US" dirty="0"/>
-              <a:t>OpenID Connect (OIDC) is a layer on top of OAuth 2.0 and </a:t>
-            </a:r>
-            <a:r>
-              <a:rPr lang="en-US" b="1" dirty="0"/>
-              <a:t>adds login and profile information </a:t>
-            </a:r>
-            <a:r>
-              <a:rPr lang="en-US" dirty="0"/>
-              <a:t>about the person who is logged in</a:t>
-            </a:r>
-          </a:p>
-          <a:p>
-            <a:pPr marL="0" indent="0">
-              <a:buNone/>
-            </a:pPr>
-            <a:endParaRPr lang="en-US" dirty="0"/>
-          </a:p>
-          <a:p>
-            <a:pPr marL="0" indent="0">
-              <a:buNone/>
-            </a:pPr>
-            <a:r>
-              <a:rPr lang="en-US" dirty="0"/>
-              <a:t>OIDC enables single-sign-on (SSO) and uses id-token (e.g. JWT)</a:t>
+            <a:r>
+              <a:rPr lang="en-US" i="1" dirty="0"/>
+              <a:t>OpenID Connect (OIDC)</a:t>
+            </a:r>
+            <a:r>
+              <a:rPr lang="en-US" dirty="0"/>
+              <a:t> – the third version of OpenID protocol, published in 2014</a:t>
             </a:r>
           </a:p>
         </p:txBody>
@@ -14930,7 +14910,7 @@
     </p:spTree>
     <p:extLst>
       <p:ext uri="{BB962C8B-B14F-4D97-AF65-F5344CB8AC3E}">
-        <p14:creationId xmlns:p14="http://schemas.microsoft.com/office/powerpoint/2010/main" val="3219792900"/>
+        <p14:creationId xmlns:p14="http://schemas.microsoft.com/office/powerpoint/2010/main" val="4048307857"/>
       </p:ext>
     </p:extLst>
   </p:cSld>
@@ -15010,12 +14990,9 @@
               <a:buNone/>
             </a:pPr>
             <a:r>
-              <a:rPr lang="en-US" dirty="0">
-                <a:hlinkClick r:id="rId3"/>
-              </a:rPr>
-              <a:t>An Illustrated Guide to OAuth and OpenID Connect</a:t>
-            </a:r>
-            <a:endParaRPr lang="en-US" dirty="0"/>
+              <a:rPr lang="en-US" dirty="0"/>
+              <a:t>OAuth 2.0 is only for authorization</a:t>
+            </a:r>
           </a:p>
           <a:p>
             <a:pPr marL="0" indent="0">
@@ -15023,12 +15000,44 @@
             </a:pPr>
             <a:endParaRPr lang="en-US" dirty="0"/>
           </a:p>
+          <a:p>
+            <a:pPr marL="0" indent="0">
+              <a:buNone/>
+            </a:pPr>
+            <a:r>
+              <a:rPr lang="en-US" dirty="0"/>
+              <a:t>OpenID Connect (OIDC) is a layer on top of OAuth 2.0 and </a:t>
+            </a:r>
+            <a:r>
+              <a:rPr lang="en-US" b="1" dirty="0"/>
+              <a:t>adds login and profile information </a:t>
+            </a:r>
+            <a:r>
+              <a:rPr lang="en-US" dirty="0"/>
+              <a:t>about the person who is logged in</a:t>
+            </a:r>
+          </a:p>
+          <a:p>
+            <a:pPr marL="0" indent="0">
+              <a:buNone/>
+            </a:pPr>
+            <a:endParaRPr lang="en-US" dirty="0"/>
+          </a:p>
+          <a:p>
+            <a:pPr marL="0" indent="0">
+              <a:buNone/>
+            </a:pPr>
+            <a:r>
+              <a:rPr lang="en-US" dirty="0"/>
+              <a:t>OIDC enables single-sign-on (SSO) and uses id-token (e.g. JWT)</a:t>
+            </a:r>
+          </a:p>
         </p:txBody>
       </p:sp>
     </p:spTree>
     <p:extLst>
       <p:ext uri="{BB962C8B-B14F-4D97-AF65-F5344CB8AC3E}">
-        <p14:creationId xmlns:p14="http://schemas.microsoft.com/office/powerpoint/2010/main" val="789021786"/>
+        <p14:creationId xmlns:p14="http://schemas.microsoft.com/office/powerpoint/2010/main" val="3219792900"/>
       </p:ext>
     </p:extLst>
   </p:cSld>
@@ -15232,11 +15241,9 @@
             </a:pPr>
             <a:r>
               <a:rPr lang="en-US" dirty="0">
-                <a:solidFill>
-                  <a:schemeClr val="accent2"/>
-                </a:solidFill>
+                <a:hlinkClick r:id="rId3"/>
               </a:rPr>
-              <a:t>AWS IAM</a:t>
+              <a:t>An Illustrated Guide to OAuth and OpenID Connect</a:t>
             </a:r>
             <a:endParaRPr lang="en-US" dirty="0"/>
           </a:p>
@@ -15244,27 +15251,6 @@
             <a:pPr marL="0" indent="0">
               <a:buNone/>
             </a:pPr>
-            <a:r>
-              <a:rPr lang="en-US" dirty="0">
-                <a:solidFill>
-                  <a:schemeClr val="accent5"/>
-                </a:solidFill>
-              </a:rPr>
-              <a:t>GCP IAM</a:t>
-            </a:r>
-          </a:p>
-          <a:p>
-            <a:pPr marL="0" indent="0">
-              <a:buNone/>
-            </a:pPr>
-            <a:r>
-              <a:rPr lang="en-US" dirty="0">
-                <a:solidFill>
-                  <a:schemeClr val="accent1"/>
-                </a:solidFill>
-              </a:rPr>
-              <a:t>Azure Active Directory (AAD)</a:t>
-            </a:r>
             <a:endParaRPr lang="en-US" dirty="0"/>
           </a:p>
         </p:txBody>
@@ -15272,7 +15258,7 @@
     </p:spTree>
     <p:extLst>
       <p:ext uri="{BB962C8B-B14F-4D97-AF65-F5344CB8AC3E}">
-        <p14:creationId xmlns:p14="http://schemas.microsoft.com/office/powerpoint/2010/main" val="1476461488"/>
+        <p14:creationId xmlns:p14="http://schemas.microsoft.com/office/powerpoint/2010/main" val="789021786"/>
       </p:ext>
     </p:extLst>
   </p:cSld>
@@ -15352,88 +15338,48 @@
               <a:buNone/>
             </a:pPr>
             <a:r>
-              <a:rPr lang="en-US" dirty="0"/>
-              <a:t>All of them covers authentication and authorization:</a:t>
-            </a:r>
-          </a:p>
-          <a:p>
-            <a:r>
-              <a:rPr lang="en-US" dirty="0"/>
-              <a:t>Verifies </a:t>
-            </a:r>
-            <a:r>
-              <a:rPr lang="en-US" i="1" dirty="0"/>
-              <a:t>Identities</a:t>
-            </a:r>
-          </a:p>
-          <a:p>
-            <a:r>
-              <a:rPr lang="en-US" dirty="0"/>
-              <a:t>Manage </a:t>
-            </a:r>
-            <a:r>
-              <a:rPr lang="en-US" i="1" dirty="0"/>
-              <a:t>Identities</a:t>
-            </a:r>
-            <a:r>
-              <a:rPr lang="en-US" dirty="0"/>
-              <a:t> access to </a:t>
-            </a:r>
-            <a:r>
-              <a:rPr lang="en-US" i="1" dirty="0"/>
-              <a:t>Resources</a:t>
-            </a:r>
-            <a:r>
-              <a:rPr lang="en-US" dirty="0"/>
-              <a:t> via </a:t>
-            </a:r>
-            <a:r>
-              <a:rPr lang="en-US" i="1" dirty="0"/>
-              <a:t>Permissions</a:t>
-            </a:r>
-          </a:p>
-          <a:p>
-            <a:r>
-              <a:rPr lang="en-US" dirty="0"/>
-              <a:t>Aggregate </a:t>
-            </a:r>
-            <a:r>
-              <a:rPr lang="en-US" i="1" dirty="0"/>
-              <a:t>Identities </a:t>
-            </a:r>
-            <a:r>
-              <a:rPr lang="en-US" dirty="0"/>
-              <a:t>into </a:t>
-            </a:r>
-            <a:r>
-              <a:rPr lang="en-US" i="1" dirty="0"/>
-              <a:t>Groups</a:t>
-            </a:r>
-          </a:p>
-          <a:p>
-            <a:r>
-              <a:rPr lang="en-US" dirty="0"/>
-              <a:t>Aggregate </a:t>
-            </a:r>
-            <a:r>
-              <a:rPr lang="en-US" i="1" dirty="0"/>
-              <a:t>Permissions</a:t>
-            </a:r>
-            <a:r>
-              <a:rPr lang="en-US" dirty="0"/>
-              <a:t> into </a:t>
-            </a:r>
-            <a:r>
-              <a:rPr lang="en-US" i="1" dirty="0"/>
-              <a:t>Roles</a:t>
-            </a:r>
+              <a:rPr lang="en-US" dirty="0">
+                <a:solidFill>
+                  <a:schemeClr val="accent2"/>
+                </a:solidFill>
+              </a:rPr>
+              <a:t>AWS IAM</a:t>
+            </a:r>
+            <a:endParaRPr lang="en-US" dirty="0"/>
+          </a:p>
+          <a:p>
+            <a:pPr marL="0" indent="0">
+              <a:buNone/>
+            </a:pPr>
+            <a:r>
+              <a:rPr lang="en-US" dirty="0">
+                <a:solidFill>
+                  <a:schemeClr val="accent5"/>
+                </a:solidFill>
+              </a:rPr>
+              <a:t>GCP IAM</a:t>
+            </a:r>
+          </a:p>
+          <a:p>
+            <a:pPr marL="0" indent="0">
+              <a:buNone/>
+            </a:pPr>
+            <a:r>
+              <a:rPr lang="en-US" dirty="0">
+                <a:solidFill>
+                  <a:schemeClr val="accent1"/>
+                </a:solidFill>
+              </a:rPr>
+              <a:t>Azure Active Directory (AAD)</a:t>
+            </a:r>
+            <a:endParaRPr lang="en-US" dirty="0"/>
           </a:p>
         </p:txBody>
       </p:sp>
     </p:spTree>
     <p:extLst>
       <p:ext uri="{BB962C8B-B14F-4D97-AF65-F5344CB8AC3E}">
-        <p14:creationId xmlns:p14="http://schemas.microsoft.com/office/powerpoint/2010/main" val="3830809263"/>
+        <p14:creationId xmlns:p14="http://schemas.microsoft.com/office/powerpoint/2010/main" val="1476461488"/>
       </p:ext>
     </p:extLst>
   </p:cSld>
@@ -15514,25 +15460,79 @@
             </a:pPr>
             <a:r>
               <a:rPr lang="en-US" dirty="0"/>
-              <a:t>Plus</a:t>
-            </a:r>
-          </a:p>
-          <a:p>
-            <a:r>
-              <a:rPr lang="en-US" dirty="0"/>
-              <a:t>Identity management</a:t>
-            </a:r>
-          </a:p>
-          <a:p>
-            <a:r>
-              <a:rPr lang="en-US" dirty="0"/>
-              <a:t>Auditing – logs to answer the question “who did what, where and when?”</a:t>
-            </a:r>
-          </a:p>
-          <a:p>
-            <a:r>
-              <a:rPr lang="en-US" dirty="0"/>
-              <a:t>Policies – enforce rules</a:t>
+              <a:t>All of them covers authentication and authorization:</a:t>
+            </a:r>
+          </a:p>
+          <a:p>
+            <a:r>
+              <a:rPr lang="en-US" dirty="0"/>
+              <a:t>Verifies </a:t>
+            </a:r>
+            <a:r>
+              <a:rPr lang="en-US" i="1" dirty="0"/>
+              <a:t>Identities</a:t>
+            </a:r>
+          </a:p>
+          <a:p>
+            <a:r>
+              <a:rPr lang="en-US" dirty="0"/>
+              <a:t>Manage </a:t>
+            </a:r>
+            <a:r>
+              <a:rPr lang="en-US" i="1" dirty="0"/>
+              <a:t>Identities</a:t>
+            </a:r>
+            <a:r>
+              <a:rPr lang="en-US" dirty="0"/>
+              <a:t> access to </a:t>
+            </a:r>
+            <a:r>
+              <a:rPr lang="en-US" i="1" dirty="0"/>
+              <a:t>Resources</a:t>
+            </a:r>
+            <a:r>
+              <a:rPr lang="en-US" dirty="0"/>
+              <a:t> via </a:t>
+            </a:r>
+            <a:r>
+              <a:rPr lang="en-US" i="1" dirty="0"/>
+              <a:t>Permissions</a:t>
+            </a:r>
+          </a:p>
+          <a:p>
+            <a:r>
+              <a:rPr lang="en-US" dirty="0"/>
+              <a:t>Aggregate </a:t>
+            </a:r>
+            <a:r>
+              <a:rPr lang="en-US" i="1" dirty="0"/>
+              <a:t>Identities </a:t>
+            </a:r>
+            <a:r>
+              <a:rPr lang="en-US" dirty="0"/>
+              <a:t>into </a:t>
+            </a:r>
+            <a:r>
+              <a:rPr lang="en-US" i="1" dirty="0"/>
+              <a:t>Groups</a:t>
+            </a:r>
+          </a:p>
+          <a:p>
+            <a:r>
+              <a:rPr lang="en-US" dirty="0"/>
+              <a:t>Aggregate </a:t>
+            </a:r>
+            <a:r>
+              <a:rPr lang="en-US" i="1" dirty="0"/>
+              <a:t>Permissions</a:t>
+            </a:r>
+            <a:r>
+              <a:rPr lang="en-US" dirty="0"/>
+              <a:t> into </a:t>
+            </a:r>
+            <a:r>
+              <a:rPr lang="en-US" i="1" dirty="0"/>
+              <a:t>Roles</a:t>
             </a:r>
           </a:p>
         </p:txBody>
@@ -15540,7 +15540,7 @@
     </p:spTree>
     <p:extLst>
       <p:ext uri="{BB962C8B-B14F-4D97-AF65-F5344CB8AC3E}">
-        <p14:creationId xmlns:p14="http://schemas.microsoft.com/office/powerpoint/2010/main" val="2686022638"/>
+        <p14:creationId xmlns:p14="http://schemas.microsoft.com/office/powerpoint/2010/main" val="3830809263"/>
       </p:ext>
     </p:extLst>
   </p:cSld>
@@ -15621,27 +15621,25 @@
             </a:pPr>
             <a:r>
               <a:rPr lang="en-US" dirty="0"/>
-              <a:t>Demo</a:t>
-            </a:r>
-          </a:p>
-          <a:p>
-            <a:pPr>
-              <a:buFontTx/>
-              <a:buChar char="-"/>
-            </a:pPr>
-            <a:r>
-              <a:rPr lang="en-US" dirty="0"/>
-              <a:t>Kubernetes RBAC</a:t>
-            </a:r>
-          </a:p>
-          <a:p>
-            <a:pPr>
-              <a:buFontTx/>
-              <a:buChar char="-"/>
-            </a:pPr>
-            <a:r>
-              <a:rPr lang="en-US" dirty="0"/>
-              <a:t>Azure Active Directory</a:t>
+              <a:t>Plus</a:t>
+            </a:r>
+          </a:p>
+          <a:p>
+            <a:r>
+              <a:rPr lang="en-US" dirty="0"/>
+              <a:t>Identity management</a:t>
+            </a:r>
+          </a:p>
+          <a:p>
+            <a:r>
+              <a:rPr lang="en-US" dirty="0"/>
+              <a:t>Auditing – logs to answer the question “who did what, where and when?”</a:t>
+            </a:r>
+          </a:p>
+          <a:p>
+            <a:r>
+              <a:rPr lang="en-US" dirty="0"/>
+              <a:t>Policies – enforce rules</a:t>
             </a:r>
           </a:p>
         </p:txBody>
@@ -15649,7 +15647,7 @@
     </p:spTree>
     <p:extLst>
       <p:ext uri="{BB962C8B-B14F-4D97-AF65-F5344CB8AC3E}">
-        <p14:creationId xmlns:p14="http://schemas.microsoft.com/office/powerpoint/2010/main" val="3705316969"/>
+        <p14:creationId xmlns:p14="http://schemas.microsoft.com/office/powerpoint/2010/main" val="2686022638"/>
       </p:ext>
     </p:extLst>
   </p:cSld>
@@ -15734,20 +15732,23 @@
             </a:r>
           </a:p>
           <a:p>
-            <a:pPr marL="0" indent="0">
-              <a:buNone/>
+            <a:pPr>
+              <a:buFontTx/>
+              <a:buChar char="-"/>
             </a:pPr>
             <a:r>
               <a:rPr lang="en-US" dirty="0"/>
-              <a:t>Review “security” aspect of </a:t>
-            </a:r>
-            <a:r>
-              <a:rPr lang="en-US" dirty="0" err="1"/>
-              <a:t>FaaS</a:t>
-            </a:r>
-            <a:r>
-              <a:rPr lang="en-US" dirty="0"/>
-              <a:t> template</a:t>
+              <a:t>Kubernetes RBAC</a:t>
+            </a:r>
+          </a:p>
+          <a:p>
+            <a:pPr>
+              <a:buFontTx/>
+              <a:buChar char="-"/>
+            </a:pPr>
+            <a:r>
+              <a:rPr lang="en-US" dirty="0"/>
+              <a:t>Azure Active Directory</a:t>
             </a:r>
           </a:p>
         </p:txBody>
@@ -15755,7 +15756,7 @@
     </p:spTree>
     <p:extLst>
       <p:ext uri="{BB962C8B-B14F-4D97-AF65-F5344CB8AC3E}">
-        <p14:creationId xmlns:p14="http://schemas.microsoft.com/office/powerpoint/2010/main" val="3461088921"/>
+        <p14:creationId xmlns:p14="http://schemas.microsoft.com/office/powerpoint/2010/main" val="3705316969"/>
       </p:ext>
     </p:extLst>
   </p:cSld>

</xml_diff>